<commit_message>
[Publication Review] Literature Mining
</commit_message>
<xml_diff>
--- a/Review/[3] Literature mining, ontologies and information visualization for drug repurposing/Literature mining, ontologies and information visualization for.pptx
+++ b/Review/[3] Literature mining, ontologies and information visualization for drug repurposing/Literature mining, ontologies and information visualization for.pptx
@@ -7,8 +7,12 @@
   <p:sldIdLst>
     <p:sldId id="256" r:id="rId2"/>
     <p:sldId id="257" r:id="rId3"/>
-    <p:sldId id="258" r:id="rId4"/>
-    <p:sldId id="259" r:id="rId5"/>
+    <p:sldId id="261" r:id="rId4"/>
+    <p:sldId id="263" r:id="rId5"/>
+    <p:sldId id="264" r:id="rId6"/>
+    <p:sldId id="262" r:id="rId7"/>
+    <p:sldId id="259" r:id="rId8"/>
+    <p:sldId id="260" r:id="rId9"/>
   </p:sldIdLst>
   <p:sldSz cx="12192000" cy="6858000"/>
   <p:notesSz cx="6858000" cy="9144000"/>
@@ -107,6 +111,11 @@
       </a:defRPr>
     </a:lvl9pPr>
   </p:defaultTextStyle>
+  <p:extLst>
+    <p:ext uri="{EFAFB233-063F-42B5-8137-9DF3F51BA10A}">
+      <p15:sldGuideLst xmlns:p15="http://schemas.microsoft.com/office/powerpoint/2012/main"/>
+    </p:ext>
+  </p:extLst>
 </p:presentation>
 </file>
 
@@ -3238,39 +3247,143 @@
           <a:lstStyle/>
           <a:p>
             <a:r>
+              <a:rPr lang="en-US" altLang="ko-KR" dirty="0"/>
+              <a:t>Literature </a:t>
+            </a:r>
+            <a:r>
               <a:rPr lang="en-US" altLang="ko-KR" dirty="0" smtClean="0"/>
-              <a:t>DRUG REPURPOSING APPLICATION</a:t>
+              <a:t>Mining</a:t>
+            </a:r>
+            <a:endParaRPr lang="en-US" altLang="ko-KR" dirty="0"/>
+          </a:p>
+        </p:txBody>
+      </p:sp>
+      <p:sp>
+        <p:nvSpPr>
+          <p:cNvPr id="3" name="내용 개체 틀 2"/>
+          <p:cNvSpPr>
+            <a:spLocks noGrp="1"/>
+          </p:cNvSpPr>
+          <p:nvPr>
+            <p:ph idx="1"/>
+          </p:nvPr>
+        </p:nvSpPr>
+        <p:spPr>
+          <a:xfrm>
+            <a:off x="994955" y="2756263"/>
+            <a:ext cx="4883331" cy="3355386"/>
+          </a:xfrm>
+        </p:spPr>
+        <p:txBody>
+          <a:bodyPr/>
+          <a:lstStyle/>
+          <a:p>
+            <a:r>
+              <a:rPr lang="en-US" altLang="ko-KR" dirty="0" smtClean="0"/>
+              <a:t>the most widely used repository of biomedical articles.</a:t>
+            </a:r>
+          </a:p>
+          <a:p>
+            <a:r>
+              <a:rPr lang="en-US" altLang="ko-KR" dirty="0" smtClean="0"/>
+              <a:t>containing over 20 million abstracts.</a:t>
+            </a:r>
+          </a:p>
+          <a:p>
+            <a:r>
+              <a:rPr lang="en-US" altLang="ko-KR" dirty="0"/>
+              <a:t>g</a:t>
+            </a:r>
+            <a:r>
+              <a:rPr lang="en-US" altLang="ko-KR" dirty="0" smtClean="0"/>
+              <a:t>rowing rapidly.</a:t>
             </a:r>
             <a:endParaRPr lang="ko-KR" altLang="en-US" dirty="0"/>
           </a:p>
-        </p:txBody>
-      </p:sp>
-      <p:sp>
-        <p:nvSpPr>
-          <p:cNvPr id="3" name="내용 개체 틀 2"/>
-          <p:cNvSpPr>
-            <a:spLocks noGrp="1"/>
-          </p:cNvSpPr>
-          <p:nvPr>
-            <p:ph idx="1"/>
-          </p:nvPr>
-        </p:nvSpPr>
-        <p:spPr/>
-        <p:txBody>
-          <a:bodyPr/>
-          <a:lstStyle/>
+          <a:p>
+            <a:endParaRPr lang="ko-KR" altLang="en-US" dirty="0"/>
+          </a:p>
+          <a:p>
+            <a:endParaRPr lang="ko-KR" altLang="en-US" dirty="0"/>
+          </a:p>
+          <a:p>
+            <a:endParaRPr lang="en-US" altLang="ko-KR" dirty="0" smtClean="0"/>
+          </a:p>
           <a:p>
             <a:pPr marL="0" indent="0">
               <a:buNone/>
             </a:pPr>
             <a:endParaRPr lang="ko-KR" altLang="en-US" dirty="0"/>
+          </a:p>
+        </p:txBody>
+      </p:sp>
+      <p:pic>
+        <p:nvPicPr>
+          <p:cNvPr id="5" name="그림 4"/>
+          <p:cNvPicPr>
+            <a:picLocks noChangeAspect="1"/>
+          </p:cNvPicPr>
+          <p:nvPr/>
+        </p:nvPicPr>
+        <p:blipFill>
+          <a:blip r:embed="rId2">
+            <a:extLst>
+              <a:ext uri="{28A0092B-C50C-407E-A947-70E740481C1C}">
+                <a14:useLocalDpi xmlns:a14="http://schemas.microsoft.com/office/drawing/2010/main" val="0"/>
+              </a:ext>
+            </a:extLst>
+          </a:blip>
+          <a:stretch>
+            <a:fillRect/>
+          </a:stretch>
+        </p:blipFill>
+        <p:spPr>
+          <a:xfrm>
+            <a:off x="6009529" y="2051299"/>
+            <a:ext cx="5344271" cy="3591426"/>
+          </a:xfrm>
+          <a:prstGeom prst="rect">
+            <a:avLst/>
+          </a:prstGeom>
+        </p:spPr>
+      </p:pic>
+      <p:sp>
+        <p:nvSpPr>
+          <p:cNvPr id="6" name="직사각형 5"/>
+          <p:cNvSpPr/>
+          <p:nvPr/>
+        </p:nvSpPr>
+        <p:spPr>
+          <a:xfrm>
+            <a:off x="585552" y="2071465"/>
+            <a:ext cx="2654037" cy="584775"/>
+          </a:xfrm>
+          <a:prstGeom prst="rect">
+            <a:avLst/>
+          </a:prstGeom>
+        </p:spPr>
+        <p:txBody>
+          <a:bodyPr wrap="square">
+            <a:spAutoFit/>
+          </a:bodyPr>
+          <a:lstStyle/>
+          <a:p>
+            <a:r>
+              <a:rPr lang="en-US" altLang="ko-KR" sz="3200" dirty="0"/>
+              <a:t>PubMed </a:t>
+            </a:r>
+            <a:r>
+              <a:rPr lang="en-US" altLang="ko-KR" sz="3200" dirty="0" smtClean="0"/>
+              <a:t>is… </a:t>
+            </a:r>
+            <a:endParaRPr lang="ko-KR" altLang="en-US" sz="3200" dirty="0"/>
           </a:p>
         </p:txBody>
       </p:sp>
     </p:spTree>
     <p:extLst>
       <p:ext uri="{BB962C8B-B14F-4D97-AF65-F5344CB8AC3E}">
-        <p14:creationId xmlns:p14="http://schemas.microsoft.com/office/powerpoint/2010/main" val="1084344996"/>
+        <p14:creationId xmlns:p14="http://schemas.microsoft.com/office/powerpoint/2010/main" val="3457943789"/>
       </p:ext>
     </p:extLst>
   </p:cSld>
@@ -3313,6 +3426,441 @@
           <a:lstStyle/>
           <a:p>
             <a:r>
+              <a:rPr lang="en-US" altLang="ko-KR" dirty="0"/>
+              <a:t>Literature </a:t>
+            </a:r>
+            <a:r>
+              <a:rPr lang="en-US" altLang="ko-KR" dirty="0" smtClean="0"/>
+              <a:t>Mining</a:t>
+            </a:r>
+            <a:endParaRPr lang="en-US" altLang="ko-KR" dirty="0"/>
+          </a:p>
+        </p:txBody>
+      </p:sp>
+      <p:sp>
+        <p:nvSpPr>
+          <p:cNvPr id="3" name="내용 개체 틀 2"/>
+          <p:cNvSpPr>
+            <a:spLocks noGrp="1"/>
+          </p:cNvSpPr>
+          <p:nvPr>
+            <p:ph idx="1"/>
+          </p:nvPr>
+        </p:nvSpPr>
+        <p:spPr>
+          <a:xfrm>
+            <a:off x="994955" y="2756263"/>
+            <a:ext cx="10239102" cy="3355386"/>
+          </a:xfrm>
+        </p:spPr>
+        <p:txBody>
+          <a:bodyPr>
+            <a:normAutofit/>
+          </a:bodyPr>
+          <a:lstStyle/>
+          <a:p>
+            <a:r>
+              <a:rPr lang="en-US" altLang="ko-KR" dirty="0" smtClean="0"/>
+              <a:t>The premise is that there are two concepts of knowledge that do not communicate explicitly with each other</a:t>
+            </a:r>
+          </a:p>
+          <a:p>
+            <a:endParaRPr lang="en-US" altLang="ko-KR" dirty="0" smtClean="0"/>
+          </a:p>
+          <a:p>
+            <a:r>
+              <a:rPr lang="en-US" altLang="ko-KR" dirty="0" smtClean="0"/>
+              <a:t>Finally established in the clinical practice.</a:t>
+            </a:r>
+            <a:endParaRPr lang="ko-KR" altLang="en-US" dirty="0"/>
+          </a:p>
+          <a:p>
+            <a:endParaRPr lang="ko-KR" altLang="en-US" dirty="0"/>
+          </a:p>
+          <a:p>
+            <a:endParaRPr lang="ko-KR" altLang="en-US" dirty="0"/>
+          </a:p>
+          <a:p>
+            <a:endParaRPr lang="en-US" altLang="ko-KR" dirty="0" smtClean="0"/>
+          </a:p>
+          <a:p>
+            <a:pPr marL="0" indent="0">
+              <a:buNone/>
+            </a:pPr>
+            <a:endParaRPr lang="ko-KR" altLang="en-US" dirty="0"/>
+          </a:p>
+        </p:txBody>
+      </p:sp>
+      <p:sp>
+        <p:nvSpPr>
+          <p:cNvPr id="6" name="직사각형 5"/>
+          <p:cNvSpPr/>
+          <p:nvPr/>
+        </p:nvSpPr>
+        <p:spPr>
+          <a:xfrm>
+            <a:off x="585552" y="2071465"/>
+            <a:ext cx="4966162" cy="584775"/>
+          </a:xfrm>
+          <a:prstGeom prst="rect">
+            <a:avLst/>
+          </a:prstGeom>
+        </p:spPr>
+        <p:txBody>
+          <a:bodyPr wrap="square">
+            <a:spAutoFit/>
+          </a:bodyPr>
+          <a:lstStyle/>
+          <a:p>
+            <a:r>
+              <a:rPr lang="en-US" altLang="ko-KR" sz="3200" dirty="0" smtClean="0"/>
+              <a:t>Swanson’s ABC model</a:t>
+            </a:r>
+            <a:endParaRPr lang="ko-KR" altLang="en-US" sz="3200" dirty="0"/>
+          </a:p>
+        </p:txBody>
+      </p:sp>
+    </p:spTree>
+    <p:extLst>
+      <p:ext uri="{BB962C8B-B14F-4D97-AF65-F5344CB8AC3E}">
+        <p14:creationId xmlns:p14="http://schemas.microsoft.com/office/powerpoint/2010/main" val="935776983"/>
+      </p:ext>
+    </p:extLst>
+  </p:cSld>
+  <p:clrMapOvr>
+    <a:masterClrMapping/>
+  </p:clrMapOvr>
+</p:sld>
+</file>
+
+<file path=ppt/slides/slide5.xml><?xml version="1.0" encoding="utf-8"?>
+<p:sld xmlns:a="http://schemas.openxmlformats.org/drawingml/2006/main" xmlns:r="http://schemas.openxmlformats.org/officeDocument/2006/relationships" xmlns:p="http://schemas.openxmlformats.org/presentationml/2006/main">
+  <p:cSld>
+    <p:spTree>
+      <p:nvGrpSpPr>
+        <p:cNvPr id="1" name=""/>
+        <p:cNvGrpSpPr/>
+        <p:nvPr/>
+      </p:nvGrpSpPr>
+      <p:grpSpPr>
+        <a:xfrm>
+          <a:off x="0" y="0"/>
+          <a:ext cx="0" cy="0"/>
+          <a:chOff x="0" y="0"/>
+          <a:chExt cx="0" cy="0"/>
+        </a:xfrm>
+      </p:grpSpPr>
+      <p:sp>
+        <p:nvSpPr>
+          <p:cNvPr id="2" name="제목 1"/>
+          <p:cNvSpPr>
+            <a:spLocks noGrp="1"/>
+          </p:cNvSpPr>
+          <p:nvPr>
+            <p:ph type="title"/>
+          </p:nvPr>
+        </p:nvSpPr>
+        <p:spPr/>
+        <p:txBody>
+          <a:bodyPr/>
+          <a:lstStyle/>
+          <a:p>
+            <a:r>
+              <a:rPr lang="en-US" altLang="ko-KR" dirty="0"/>
+              <a:t>Literature </a:t>
+            </a:r>
+            <a:r>
+              <a:rPr lang="en-US" altLang="ko-KR" dirty="0" smtClean="0"/>
+              <a:t>Mining</a:t>
+            </a:r>
+            <a:endParaRPr lang="en-US" altLang="ko-KR" dirty="0"/>
+          </a:p>
+        </p:txBody>
+      </p:sp>
+      <p:sp>
+        <p:nvSpPr>
+          <p:cNvPr id="3" name="내용 개체 틀 2"/>
+          <p:cNvSpPr>
+            <a:spLocks noGrp="1"/>
+          </p:cNvSpPr>
+          <p:nvPr>
+            <p:ph idx="1"/>
+          </p:nvPr>
+        </p:nvSpPr>
+        <p:spPr>
+          <a:xfrm>
+            <a:off x="994955" y="2756263"/>
+            <a:ext cx="4883331" cy="3355386"/>
+          </a:xfrm>
+        </p:spPr>
+        <p:txBody>
+          <a:bodyPr>
+            <a:normAutofit/>
+          </a:bodyPr>
+          <a:lstStyle/>
+          <a:p>
+            <a:pPr marL="0" indent="0">
+              <a:buNone/>
+            </a:pPr>
+            <a:endParaRPr lang="ko-KR" altLang="en-US" dirty="0"/>
+          </a:p>
+          <a:p>
+            <a:endParaRPr lang="ko-KR" altLang="en-US" dirty="0"/>
+          </a:p>
+          <a:p>
+            <a:endParaRPr lang="ko-KR" altLang="en-US" dirty="0"/>
+          </a:p>
+          <a:p>
+            <a:endParaRPr lang="en-US" altLang="ko-KR" dirty="0" smtClean="0"/>
+          </a:p>
+          <a:p>
+            <a:pPr marL="0" indent="0">
+              <a:buNone/>
+            </a:pPr>
+            <a:endParaRPr lang="ko-KR" altLang="en-US" dirty="0"/>
+          </a:p>
+        </p:txBody>
+      </p:sp>
+      <p:sp>
+        <p:nvSpPr>
+          <p:cNvPr id="6" name="직사각형 5"/>
+          <p:cNvSpPr/>
+          <p:nvPr/>
+        </p:nvSpPr>
+        <p:spPr>
+          <a:xfrm>
+            <a:off x="585552" y="2071465"/>
+            <a:ext cx="10269682" cy="584775"/>
+          </a:xfrm>
+          <a:prstGeom prst="rect">
+            <a:avLst/>
+          </a:prstGeom>
+        </p:spPr>
+        <p:txBody>
+          <a:bodyPr wrap="square">
+            <a:spAutoFit/>
+          </a:bodyPr>
+          <a:lstStyle/>
+          <a:p>
+            <a:r>
+              <a:rPr lang="en-US" altLang="ko-KR" sz="3200" dirty="0" smtClean="0"/>
+              <a:t>Swanson’s ABC model : 2 types</a:t>
+            </a:r>
+            <a:endParaRPr lang="ko-KR" altLang="en-US" sz="3200" dirty="0"/>
+          </a:p>
+        </p:txBody>
+      </p:sp>
+      <p:pic>
+        <p:nvPicPr>
+          <p:cNvPr id="4" name="그림 3"/>
+          <p:cNvPicPr>
+            <a:picLocks noChangeAspect="1"/>
+          </p:cNvPicPr>
+          <p:nvPr/>
+        </p:nvPicPr>
+        <p:blipFill>
+          <a:blip r:embed="rId2">
+            <a:extLst>
+              <a:ext uri="{28A0092B-C50C-407E-A947-70E740481C1C}">
+                <a14:useLocalDpi xmlns:a14="http://schemas.microsoft.com/office/drawing/2010/main" val="0"/>
+              </a:ext>
+            </a:extLst>
+          </a:blip>
+          <a:stretch>
+            <a:fillRect/>
+          </a:stretch>
+        </p:blipFill>
+        <p:spPr>
+          <a:xfrm>
+            <a:off x="3436620" y="2656240"/>
+            <a:ext cx="5734850" cy="3867690"/>
+          </a:xfrm>
+          <a:prstGeom prst="rect">
+            <a:avLst/>
+          </a:prstGeom>
+        </p:spPr>
+      </p:pic>
+      <p:sp>
+        <p:nvSpPr>
+          <p:cNvPr id="7" name="직사각형 6"/>
+          <p:cNvSpPr/>
+          <p:nvPr/>
+        </p:nvSpPr>
+        <p:spPr>
+          <a:xfrm>
+            <a:off x="2290152" y="2756263"/>
+            <a:ext cx="2953344" cy="369332"/>
+          </a:xfrm>
+          <a:prstGeom prst="rect">
+            <a:avLst/>
+          </a:prstGeom>
+        </p:spPr>
+        <p:txBody>
+          <a:bodyPr wrap="square">
+            <a:spAutoFit/>
+          </a:bodyPr>
+          <a:lstStyle/>
+          <a:p>
+            <a:r>
+              <a:rPr lang="en-US" altLang="ko-KR" dirty="0" smtClean="0"/>
+              <a:t>Closed Process</a:t>
+            </a:r>
+            <a:endParaRPr lang="ko-KR" altLang="en-US" dirty="0"/>
+          </a:p>
+        </p:txBody>
+      </p:sp>
+      <p:sp>
+        <p:nvSpPr>
+          <p:cNvPr id="8" name="직사각형 7"/>
+          <p:cNvSpPr/>
+          <p:nvPr/>
+        </p:nvSpPr>
+        <p:spPr>
+          <a:xfrm>
+            <a:off x="2290152" y="4064624"/>
+            <a:ext cx="2953344" cy="369332"/>
+          </a:xfrm>
+          <a:prstGeom prst="rect">
+            <a:avLst/>
+          </a:prstGeom>
+        </p:spPr>
+        <p:txBody>
+          <a:bodyPr wrap="square">
+            <a:spAutoFit/>
+          </a:bodyPr>
+          <a:lstStyle/>
+          <a:p>
+            <a:r>
+              <a:rPr lang="en-US" altLang="ko-KR" smtClean="0"/>
+              <a:t>Open</a:t>
+            </a:r>
+            <a:endParaRPr lang="ko-KR" altLang="en-US" dirty="0"/>
+          </a:p>
+        </p:txBody>
+      </p:sp>
+    </p:spTree>
+    <p:extLst>
+      <p:ext uri="{BB962C8B-B14F-4D97-AF65-F5344CB8AC3E}">
+        <p14:creationId xmlns:p14="http://schemas.microsoft.com/office/powerpoint/2010/main" val="2687101409"/>
+      </p:ext>
+    </p:extLst>
+  </p:cSld>
+  <p:clrMapOvr>
+    <a:masterClrMapping/>
+  </p:clrMapOvr>
+</p:sld>
+</file>
+
+<file path=ppt/slides/slide6.xml><?xml version="1.0" encoding="utf-8"?>
+<p:sld xmlns:a="http://schemas.openxmlformats.org/drawingml/2006/main" xmlns:r="http://schemas.openxmlformats.org/officeDocument/2006/relationships" xmlns:p="http://schemas.openxmlformats.org/presentationml/2006/main">
+  <p:cSld>
+    <p:spTree>
+      <p:nvGrpSpPr>
+        <p:cNvPr id="1" name=""/>
+        <p:cNvGrpSpPr/>
+        <p:nvPr/>
+      </p:nvGrpSpPr>
+      <p:grpSpPr>
+        <a:xfrm>
+          <a:off x="0" y="0"/>
+          <a:ext cx="0" cy="0"/>
+          <a:chOff x="0" y="0"/>
+          <a:chExt cx="0" cy="0"/>
+        </a:xfrm>
+      </p:grpSpPr>
+      <p:sp>
+        <p:nvSpPr>
+          <p:cNvPr id="2" name="제목 1"/>
+          <p:cNvSpPr>
+            <a:spLocks noGrp="1"/>
+          </p:cNvSpPr>
+          <p:nvPr>
+            <p:ph type="title"/>
+          </p:nvPr>
+        </p:nvSpPr>
+        <p:spPr/>
+        <p:txBody>
+          <a:bodyPr>
+            <a:normAutofit fontScale="90000"/>
+          </a:bodyPr>
+          <a:lstStyle/>
+          <a:p>
+            <a:r>
+              <a:rPr lang="en-US" altLang="ko-KR" dirty="0"/>
+              <a:t>Semantic web technologies and ontologies</a:t>
+            </a:r>
+            <a:br>
+              <a:rPr lang="en-US" altLang="ko-KR" dirty="0"/>
+            </a:br>
+            <a:endParaRPr lang="ko-KR" altLang="en-US" dirty="0"/>
+          </a:p>
+        </p:txBody>
+      </p:sp>
+      <p:sp>
+        <p:nvSpPr>
+          <p:cNvPr id="3" name="내용 개체 틀 2"/>
+          <p:cNvSpPr>
+            <a:spLocks noGrp="1"/>
+          </p:cNvSpPr>
+          <p:nvPr>
+            <p:ph idx="1"/>
+          </p:nvPr>
+        </p:nvSpPr>
+        <p:spPr/>
+        <p:txBody>
+          <a:bodyPr/>
+          <a:lstStyle/>
+          <a:p>
+            <a:endParaRPr lang="ko-KR" altLang="en-US" dirty="0"/>
+          </a:p>
+        </p:txBody>
+      </p:sp>
+    </p:spTree>
+    <p:extLst>
+      <p:ext uri="{BB962C8B-B14F-4D97-AF65-F5344CB8AC3E}">
+        <p14:creationId xmlns:p14="http://schemas.microsoft.com/office/powerpoint/2010/main" val="3008715836"/>
+      </p:ext>
+    </p:extLst>
+  </p:cSld>
+  <p:clrMapOvr>
+    <a:masterClrMapping/>
+  </p:clrMapOvr>
+</p:sld>
+</file>
+
+<file path=ppt/slides/slide7.xml><?xml version="1.0" encoding="utf-8"?>
+<p:sld xmlns:a="http://schemas.openxmlformats.org/drawingml/2006/main" xmlns:r="http://schemas.openxmlformats.org/officeDocument/2006/relationships" xmlns:p="http://schemas.openxmlformats.org/presentationml/2006/main">
+  <p:cSld>
+    <p:spTree>
+      <p:nvGrpSpPr>
+        <p:cNvPr id="1" name=""/>
+        <p:cNvGrpSpPr/>
+        <p:nvPr/>
+      </p:nvGrpSpPr>
+      <p:grpSpPr>
+        <a:xfrm>
+          <a:off x="0" y="0"/>
+          <a:ext cx="0" cy="0"/>
+          <a:chOff x="0" y="0"/>
+          <a:chExt cx="0" cy="0"/>
+        </a:xfrm>
+      </p:grpSpPr>
+      <p:sp>
+        <p:nvSpPr>
+          <p:cNvPr id="2" name="제목 1"/>
+          <p:cNvSpPr>
+            <a:spLocks noGrp="1"/>
+          </p:cNvSpPr>
+          <p:nvPr>
+            <p:ph type="title"/>
+          </p:nvPr>
+        </p:nvSpPr>
+        <p:spPr/>
+        <p:txBody>
+          <a:bodyPr/>
+          <a:lstStyle/>
+          <a:p>
+            <a:r>
               <a:rPr lang="en-US" altLang="ko-KR" dirty="0" smtClean="0"/>
               <a:t>CONCLUDING REMARKS</a:t>
             </a:r>
@@ -3346,6 +3894,152 @@
     <p:extLst>
       <p:ext uri="{BB962C8B-B14F-4D97-AF65-F5344CB8AC3E}">
         <p14:creationId xmlns:p14="http://schemas.microsoft.com/office/powerpoint/2010/main" val="2723385735"/>
+      </p:ext>
+    </p:extLst>
+  </p:cSld>
+  <p:clrMapOvr>
+    <a:masterClrMapping/>
+  </p:clrMapOvr>
+</p:sld>
+</file>
+
+<file path=ppt/slides/slide8.xml><?xml version="1.0" encoding="utf-8"?>
+<p:sld xmlns:a="http://schemas.openxmlformats.org/drawingml/2006/main" xmlns:r="http://schemas.openxmlformats.org/officeDocument/2006/relationships" xmlns:p="http://schemas.openxmlformats.org/presentationml/2006/main">
+  <p:cSld>
+    <p:spTree>
+      <p:nvGrpSpPr>
+        <p:cNvPr id="1" name=""/>
+        <p:cNvGrpSpPr/>
+        <p:nvPr/>
+      </p:nvGrpSpPr>
+      <p:grpSpPr>
+        <a:xfrm>
+          <a:off x="0" y="0"/>
+          <a:ext cx="0" cy="0"/>
+          <a:chOff x="0" y="0"/>
+          <a:chExt cx="0" cy="0"/>
+        </a:xfrm>
+      </p:grpSpPr>
+      <p:sp>
+        <p:nvSpPr>
+          <p:cNvPr id="2" name="제목 1"/>
+          <p:cNvSpPr>
+            <a:spLocks noGrp="1"/>
+          </p:cNvSpPr>
+          <p:nvPr>
+            <p:ph type="title"/>
+          </p:nvPr>
+        </p:nvSpPr>
+        <p:spPr/>
+        <p:txBody>
+          <a:bodyPr/>
+          <a:lstStyle/>
+          <a:p>
+            <a:r>
+              <a:rPr lang="en-US" altLang="ko-KR" dirty="0" err="1" smtClean="0"/>
+              <a:t>KeyPoint</a:t>
+            </a:r>
+            <a:endParaRPr lang="ko-KR" altLang="en-US" dirty="0"/>
+          </a:p>
+        </p:txBody>
+      </p:sp>
+      <p:sp>
+        <p:nvSpPr>
+          <p:cNvPr id="3" name="내용 개체 틀 2"/>
+          <p:cNvSpPr>
+            <a:spLocks noGrp="1"/>
+          </p:cNvSpPr>
+          <p:nvPr>
+            <p:ph idx="1"/>
+          </p:nvPr>
+        </p:nvSpPr>
+        <p:spPr/>
+        <p:txBody>
+          <a:bodyPr>
+            <a:normAutofit fontScale="62500" lnSpcReduction="20000"/>
+          </a:bodyPr>
+          <a:lstStyle/>
+          <a:p>
+            <a:pPr marL="0" indent="0">
+              <a:buNone/>
+            </a:pPr>
+            <a:r>
+              <a:rPr lang="en-US" altLang="ko-KR" dirty="0" smtClean="0"/>
+              <a:t>The productivity challenge of traditional drug discovery, has sparked a renewed interest to DR, as an alternative approach to traditional drug discovery.</a:t>
+            </a:r>
+          </a:p>
+          <a:p>
+            <a:pPr marL="0" indent="0">
+              <a:buNone/>
+            </a:pPr>
+            <a:r>
+              <a:rPr lang="en-US" altLang="ko-KR" dirty="0" smtClean="0"/>
+              <a:t>As research on a single topic may be spanning across many scientific disciplines and biomedical journals, it is increasingly difficult for scientists to follow all advances in their field of interest. </a:t>
+            </a:r>
+            <a:r>
+              <a:rPr lang="en-US" altLang="ko-KR" dirty="0" smtClean="0"/>
+              <a:t>Advances in literature </a:t>
+            </a:r>
+            <a:r>
+              <a:rPr lang="en-US" altLang="ko-KR" dirty="0" smtClean="0"/>
+              <a:t>mining have made it possible to infer relationships between biomedical concepts, even if they are not mentioned in the same abstract.</a:t>
+            </a:r>
+          </a:p>
+          <a:p>
+            <a:pPr marL="0" indent="0">
+              <a:buNone/>
+            </a:pPr>
+            <a:endParaRPr lang="en-US" altLang="ko-KR" dirty="0"/>
+          </a:p>
+          <a:p>
+            <a:pPr marL="0" indent="0">
+              <a:buNone/>
+            </a:pPr>
+            <a:r>
+              <a:rPr lang="en-US" altLang="ko-KR" dirty="0" smtClean="0"/>
+              <a:t>Biomedical literature mining, especially the combination of efficient IE with LBD seems to be well suited as a strategy to generate scientific hypotheses related to finding new uses for existing drugs.</a:t>
+            </a:r>
+          </a:p>
+          <a:p>
+            <a:pPr marL="0" indent="0">
+              <a:buNone/>
+            </a:pPr>
+            <a:r>
+              <a:rPr lang="en-US" altLang="ko-KR" dirty="0" smtClean="0"/>
+              <a:t>Ontologies capture domain knowledge, concepts and their relationships, and have been used to infer unknown relationships, </a:t>
+            </a:r>
+            <a:r>
+              <a:rPr lang="en-US" altLang="ko-KR" dirty="0" err="1" smtClean="0"/>
+              <a:t>throught</a:t>
+            </a:r>
+            <a:r>
+              <a:rPr lang="en-US" altLang="ko-KR" dirty="0" smtClean="0"/>
+              <a:t> automated reasoning , making them indispensable in drug repurposing.</a:t>
+            </a:r>
+          </a:p>
+          <a:p>
+            <a:pPr marL="0" indent="0">
+              <a:buNone/>
+            </a:pPr>
+            <a:r>
+              <a:rPr lang="en-US" altLang="ko-KR" dirty="0" smtClean="0"/>
+              <a:t>Visualization techniques in articles relevant to drug repurposing are either used to conceptualize an automatic algorithm for detection of an association of interest or simply act as an exploration tool to manually perform the </a:t>
+            </a:r>
+            <a:r>
+              <a:rPr lang="en-US" altLang="ko-KR" dirty="0" err="1" smtClean="0"/>
+              <a:t>dectection</a:t>
+            </a:r>
+            <a:r>
+              <a:rPr lang="en-US" altLang="ko-KR" dirty="0" smtClean="0"/>
+              <a:t>.</a:t>
+            </a:r>
+          </a:p>
+        </p:txBody>
+      </p:sp>
+    </p:spTree>
+    <p:extLst>
+      <p:ext uri="{BB962C8B-B14F-4D97-AF65-F5344CB8AC3E}">
+        <p14:creationId xmlns:p14="http://schemas.microsoft.com/office/powerpoint/2010/main" val="2989331739"/>
       </p:ext>
     </p:extLst>
   </p:cSld>

</xml_diff>

<commit_message>
[Publication Review] Literature Mining3
</commit_message>
<xml_diff>
--- a/Review/[3] Literature mining, ontologies and information visualization for drug repurposing/Literature mining, ontologies and information visualization for.pptx
+++ b/Review/[3] Literature mining, ontologies and information visualization for drug repurposing/Literature mining, ontologies and information visualization for.pptx
@@ -522,20 +522,16 @@
           <a:lstStyle/>
           <a:p>
             <a:r>
-              <a:rPr lang="en-US" altLang="ko-KR" smtClean="0"/>
+              <a:rPr lang="en-US" altLang="ko-KR" dirty="0" smtClean="0"/>
               <a:t>Literature</a:t>
             </a:r>
             <a:r>
-              <a:rPr lang="en-US" altLang="ko-KR" baseline="0" smtClean="0"/>
+              <a:rPr lang="en-US" altLang="ko-KR" baseline="0" dirty="0" smtClean="0"/>
               <a:t> mining</a:t>
             </a:r>
             <a:r>
-              <a:rPr lang="ko-KR" altLang="en-US" baseline="0" smtClean="0"/>
-              <a:t>을 </a:t>
-            </a:r>
-            <a:r>
               <a:rPr lang="ko-KR" altLang="en-US" baseline="0" dirty="0" smtClean="0"/>
-              <a:t>어떻게 진행하고</a:t>
+              <a:t>을 어떻게 진행하고</a:t>
             </a:r>
             <a:endParaRPr lang="en-US" altLang="ko-KR" baseline="0" dirty="0" smtClean="0"/>
           </a:p>
@@ -634,6 +630,57 @@
           <a:p>
             <a:r>
               <a:rPr lang="en-US" altLang="ko-KR" dirty="0" smtClean="0"/>
+              <a:t>*** PubMed</a:t>
+            </a:r>
+            <a:r>
+              <a:rPr lang="ko-KR" altLang="en-US" dirty="0" smtClean="0"/>
+              <a:t>엔 </a:t>
+            </a:r>
+            <a:r>
+              <a:rPr lang="en-US" altLang="ko-KR" dirty="0" smtClean="0"/>
+              <a:t>Literature</a:t>
+            </a:r>
+            <a:r>
+              <a:rPr lang="ko-KR" altLang="en-US" dirty="0" smtClean="0"/>
+              <a:t>가 주이기 때문에</a:t>
+            </a:r>
+            <a:endParaRPr lang="en-US" altLang="ko-KR" dirty="0" smtClean="0"/>
+          </a:p>
+          <a:p>
+            <a:r>
+              <a:rPr lang="en-US" altLang="ko-KR" dirty="0" smtClean="0"/>
+              <a:t>Literature</a:t>
+            </a:r>
+            <a:r>
+              <a:rPr lang="ko-KR" altLang="en-US" dirty="0" smtClean="0"/>
+              <a:t>와 </a:t>
+            </a:r>
+            <a:r>
+              <a:rPr lang="en-US" altLang="ko-KR" dirty="0" smtClean="0"/>
+              <a:t>Ontology</a:t>
+            </a:r>
+            <a:r>
+              <a:rPr lang="ko-KR" altLang="en-US" dirty="0" smtClean="0"/>
+              <a:t>를 나누어 </a:t>
+            </a:r>
+            <a:r>
+              <a:rPr lang="ko-KR" altLang="en-US" dirty="0" err="1" smtClean="0"/>
+              <a:t>봐야해</a:t>
+            </a:r>
+            <a:endParaRPr lang="en-US" altLang="ko-KR" dirty="0" smtClean="0"/>
+          </a:p>
+          <a:p>
+            <a:endParaRPr lang="en-US" altLang="ko-KR" dirty="0" smtClean="0"/>
+          </a:p>
+          <a:p>
+            <a:endParaRPr lang="en-US" altLang="ko-KR" dirty="0" smtClean="0"/>
+          </a:p>
+          <a:p>
+            <a:endParaRPr lang="en-US" altLang="ko-KR" dirty="0" smtClean="0"/>
+          </a:p>
+          <a:p>
+            <a:r>
+              <a:rPr lang="en-US" altLang="ko-KR" dirty="0" smtClean="0"/>
               <a:t>co-</a:t>
             </a:r>
             <a:r>
@@ -948,6 +995,148 @@
           <a:bodyPr/>
           <a:lstStyle/>
           <a:p>
+            <a:r>
+              <a:rPr lang="ko-KR" altLang="en-US" dirty="0" smtClean="0"/>
+              <a:t>더 정확한 증상을 </a:t>
+            </a:r>
+            <a:r>
+              <a:rPr lang="ko-KR" altLang="en-US" dirty="0" err="1" smtClean="0"/>
+              <a:t>근거있게</a:t>
+            </a:r>
+            <a:r>
+              <a:rPr lang="ko-KR" altLang="en-US" dirty="0" smtClean="0"/>
+              <a:t> 예측할 수 있거나 부작용으로 이끄는 </a:t>
+            </a:r>
+            <a:r>
+              <a:rPr lang="en-US" altLang="ko-KR" dirty="0" smtClean="0"/>
+              <a:t>signaling pathway</a:t>
+            </a:r>
+            <a:r>
+              <a:rPr lang="ko-KR" altLang="en-US" dirty="0" smtClean="0"/>
+              <a:t>를 피할 수 있을 것이다</a:t>
+            </a:r>
+            <a:r>
+              <a:rPr lang="en-US" altLang="ko-KR" dirty="0" smtClean="0"/>
+              <a:t>.</a:t>
+            </a:r>
+          </a:p>
+          <a:p>
+            <a:endParaRPr lang="en-US" altLang="ko-KR" dirty="0" smtClean="0"/>
+          </a:p>
+          <a:p>
+            <a:r>
+              <a:rPr lang="ko-KR" altLang="en-US" dirty="0" smtClean="0"/>
+              <a:t>그리고 </a:t>
+            </a:r>
+            <a:r>
+              <a:rPr lang="en-US" altLang="ko-KR" dirty="0" smtClean="0"/>
+              <a:t>DR </a:t>
+            </a:r>
+            <a:r>
+              <a:rPr lang="ko-KR" altLang="en-US" dirty="0" smtClean="0"/>
+              <a:t>과정에서 중요한 점은</a:t>
+            </a:r>
+            <a:endParaRPr lang="en-US" altLang="ko-KR" dirty="0" smtClean="0"/>
+          </a:p>
+          <a:p>
+            <a:r>
+              <a:rPr lang="en-US" altLang="ko-KR" dirty="0" smtClean="0"/>
+              <a:t>1. </a:t>
+            </a:r>
+            <a:r>
+              <a:rPr lang="ko-KR" altLang="en-US" dirty="0" smtClean="0"/>
+              <a:t>모든 가설은 전문가에 의해 직접 만들어져야 한다</a:t>
+            </a:r>
+            <a:r>
+              <a:rPr lang="en-US" altLang="ko-KR" dirty="0" smtClean="0"/>
+              <a:t>.</a:t>
+            </a:r>
+          </a:p>
+          <a:p>
+            <a:r>
+              <a:rPr lang="ko-KR" altLang="en-US" dirty="0" smtClean="0"/>
+              <a:t>전문가가 직접 수행함으로써</a:t>
+            </a:r>
+            <a:r>
+              <a:rPr lang="en-US" altLang="ko-KR" dirty="0" smtClean="0"/>
+              <a:t>, </a:t>
+            </a:r>
+            <a:r>
+              <a:rPr lang="ko-KR" altLang="en-US" dirty="0" smtClean="0"/>
+              <a:t>불확실성이 줄어들고</a:t>
+            </a:r>
+            <a:r>
+              <a:rPr lang="en-US" altLang="ko-KR" dirty="0" smtClean="0"/>
+              <a:t>, novel association</a:t>
+            </a:r>
+            <a:r>
+              <a:rPr lang="ko-KR" altLang="en-US" dirty="0" smtClean="0"/>
+              <a:t>과 연관된 다른 </a:t>
+            </a:r>
+            <a:r>
+              <a:rPr lang="en-US" altLang="ko-KR" dirty="0" smtClean="0"/>
+              <a:t>parameters</a:t>
+            </a:r>
+            <a:r>
+              <a:rPr lang="ko-KR" altLang="en-US" dirty="0" smtClean="0"/>
+              <a:t>들을 고려 할 수 있다</a:t>
+            </a:r>
+            <a:r>
+              <a:rPr lang="en-US" altLang="ko-KR" dirty="0" smtClean="0"/>
+              <a:t>.</a:t>
+            </a:r>
+          </a:p>
+          <a:p>
+            <a:r>
+              <a:rPr lang="en-US" altLang="ko-KR" dirty="0" smtClean="0"/>
+              <a:t>2. </a:t>
+            </a:r>
+            <a:r>
+              <a:rPr lang="ko-KR" altLang="en-US" dirty="0" smtClean="0"/>
+              <a:t>유해반응이 발생한다는 가능성이 없다고 가정해선 </a:t>
+            </a:r>
+            <a:r>
+              <a:rPr lang="ko-KR" altLang="en-US" dirty="0" err="1" smtClean="0"/>
+              <a:t>안된다</a:t>
+            </a:r>
+            <a:r>
+              <a:rPr lang="en-US" altLang="ko-KR" dirty="0" smtClean="0"/>
+              <a:t>.</a:t>
+            </a:r>
+          </a:p>
+          <a:p>
+            <a:r>
+              <a:rPr lang="ko-KR" altLang="en-US" dirty="0" smtClean="0"/>
+              <a:t>이미 기존의 있는 </a:t>
+            </a:r>
+            <a:r>
+              <a:rPr lang="en-US" altLang="ko-KR" dirty="0" smtClean="0"/>
+              <a:t>drugs</a:t>
+            </a:r>
+            <a:r>
+              <a:rPr lang="ko-KR" altLang="en-US" dirty="0" smtClean="0"/>
+              <a:t>를 이용해 수행하는 것이기 때문에</a:t>
+            </a:r>
+            <a:r>
+              <a:rPr lang="en-US" altLang="ko-KR" dirty="0" smtClean="0"/>
+              <a:t>, </a:t>
+            </a:r>
+            <a:r>
+              <a:rPr lang="ko-KR" altLang="en-US" dirty="0" smtClean="0"/>
+              <a:t>모든 안전성 검사가 되어있더라도</a:t>
+            </a:r>
+            <a:r>
+              <a:rPr lang="en-US" altLang="ko-KR" dirty="0" smtClean="0"/>
+              <a:t>, </a:t>
+            </a:r>
+            <a:r>
+              <a:rPr lang="ko-KR" altLang="en-US" dirty="0" smtClean="0"/>
+              <a:t>부작용이 발생하지 않는다는 것은 아니다</a:t>
+            </a:r>
+            <a:r>
+              <a:rPr lang="en-US" altLang="ko-KR" dirty="0" smtClean="0"/>
+              <a:t>.</a:t>
+            </a:r>
             <a:endParaRPr lang="ko-KR" altLang="en-US" dirty="0"/>
           </a:p>
         </p:txBody>
@@ -1599,15 +1788,15 @@
             </a:r>
             <a:r>
               <a:rPr lang="ko-KR" altLang="en-US" dirty="0" smtClean="0"/>
-              <a:t>의 </a:t>
-            </a:r>
-            <a:r>
-              <a:rPr lang="ko-KR" altLang="en-US" dirty="0" err="1" smtClean="0"/>
-              <a:t>단계중</a:t>
+              <a:t>의 필수</a:t>
+            </a:r>
+            <a:r>
+              <a:rPr lang="ko-KR" altLang="en-US" baseline="0" dirty="0" smtClean="0"/>
+              <a:t> 조건으로</a:t>
             </a:r>
             <a:r>
               <a:rPr lang="ko-KR" altLang="en-US" dirty="0" smtClean="0"/>
-              <a:t> 하나로써 </a:t>
+              <a:t>써 </a:t>
             </a:r>
             <a:r>
               <a:rPr lang="en-US" altLang="ko-KR" dirty="0" smtClean="0"/>
@@ -1635,6 +1824,9 @@
             </a:r>
           </a:p>
           <a:p>
+            <a:endParaRPr lang="en-US" altLang="ko-KR" dirty="0" smtClean="0"/>
+          </a:p>
+          <a:p>
             <a:r>
               <a:rPr lang="en-US" altLang="ko-KR" dirty="0" smtClean="0"/>
               <a:t>UMLS</a:t>
@@ -1649,7 +1841,36 @@
             </a:r>
             <a:r>
               <a:rPr lang="ko-KR" altLang="en-US" dirty="0" smtClean="0"/>
-              <a:t>같은 사전</a:t>
+              <a:t>같은 사전에서 용어를 식별함</a:t>
+            </a:r>
+            <a:r>
+              <a:rPr lang="en-US" altLang="ko-KR" dirty="0" smtClean="0"/>
+              <a:t>.</a:t>
+            </a:r>
+          </a:p>
+          <a:p>
+            <a:endParaRPr lang="en-US" altLang="ko-KR" dirty="0" smtClean="0"/>
+          </a:p>
+          <a:p>
+            <a:r>
+              <a:rPr lang="ko-KR" altLang="en-US" dirty="0" smtClean="0"/>
+              <a:t>동의어나 다의성</a:t>
+            </a:r>
+            <a:r>
+              <a:rPr lang="en-US" altLang="ko-KR" dirty="0" smtClean="0"/>
+              <a:t>,</a:t>
+            </a:r>
+            <a:r>
+              <a:rPr lang="en-US" altLang="ko-KR" baseline="0" dirty="0" smtClean="0"/>
+              <a:t> </a:t>
+            </a:r>
+            <a:r>
+              <a:rPr lang="ko-KR" altLang="en-US" baseline="0" dirty="0" smtClean="0"/>
+              <a:t>그리고 부족한 용어 표준화 때문에 상당히 어려운 과정이라고 함</a:t>
+            </a:r>
+            <a:r>
+              <a:rPr lang="en-US" altLang="ko-KR" baseline="0" dirty="0" smtClean="0"/>
+              <a:t>.,</a:t>
             </a:r>
             <a:endParaRPr lang="en-US" altLang="ko-KR" dirty="0" smtClean="0"/>
           </a:p>
@@ -1800,9 +2021,17 @@
             </a:r>
           </a:p>
           <a:p>
-            <a:pPr marL="228600" indent="-228600">
-              <a:buAutoNum type="arabicPeriod"/>
+            <a:pPr marL="0" indent="0">
+              <a:buNone/>
             </a:pPr>
+            <a:r>
+              <a:rPr lang="en-US" altLang="ko-KR" dirty="0" smtClean="0"/>
+              <a:t>1.</a:t>
+            </a:r>
+            <a:r>
+              <a:rPr lang="en-US" altLang="ko-KR" baseline="0" dirty="0" smtClean="0"/>
+              <a:t> </a:t>
+            </a:r>
             <a:r>
               <a:rPr lang="en-US" altLang="ko-KR" dirty="0" smtClean="0"/>
               <a:t>Tokenized word</a:t>
@@ -1926,48 +2155,6 @@
               <a:rPr lang="en-US" altLang="ko-KR" dirty="0" smtClean="0"/>
               <a:t>.</a:t>
             </a:r>
-          </a:p>
-          <a:p>
-            <a:pPr marL="0" indent="0">
-              <a:buNone/>
-            </a:pPr>
-            <a:endParaRPr lang="en-US" altLang="ko-KR" dirty="0" smtClean="0"/>
-          </a:p>
-          <a:p>
-            <a:pPr marL="0" indent="0">
-              <a:buNone/>
-            </a:pPr>
-            <a:r>
-              <a:rPr lang="ko-KR" altLang="en-US" dirty="0" smtClean="0"/>
-              <a:t>근데 이 </a:t>
-            </a:r>
-            <a:r>
-              <a:rPr lang="en-US" altLang="ko-KR" dirty="0" smtClean="0"/>
-              <a:t>Literature</a:t>
-            </a:r>
-            <a:r>
-              <a:rPr lang="en-US" altLang="ko-KR" baseline="0" dirty="0" smtClean="0"/>
-              <a:t> Mining</a:t>
-            </a:r>
-            <a:r>
-              <a:rPr lang="ko-KR" altLang="en-US" baseline="0" dirty="0" smtClean="0"/>
-              <a:t>을 어떤 데이터를 이용해 진행하느냐</a:t>
-            </a:r>
-            <a:endParaRPr lang="en-US" altLang="ko-KR" baseline="0" dirty="0" smtClean="0"/>
-          </a:p>
-          <a:p>
-            <a:pPr marL="0" indent="0">
-              <a:buNone/>
-            </a:pPr>
-            <a:r>
-              <a:rPr lang="en-US" altLang="ko-KR" baseline="0" dirty="0" err="1" smtClean="0"/>
-              <a:t>Pubmed</a:t>
-            </a:r>
-            <a:r>
-              <a:rPr lang="ko-KR" altLang="en-US" baseline="0" dirty="0" smtClean="0"/>
-              <a:t>라는 부분이 나옵니다</a:t>
-            </a:r>
-            <a:endParaRPr lang="en-US" altLang="ko-KR" dirty="0" smtClean="0"/>
           </a:p>
         </p:txBody>
       </p:sp>
@@ -2076,6 +2263,15 @@
               <a:t>.</a:t>
             </a:r>
           </a:p>
+          <a:p>
+            <a:endParaRPr lang="en-US" altLang="ko-KR" dirty="0" smtClean="0"/>
+          </a:p>
+          <a:p>
+            <a:r>
+              <a:rPr lang="en-US" altLang="ko-KR" dirty="0" smtClean="0"/>
+              <a:t>RDF</a:t>
+            </a:r>
+          </a:p>
         </p:txBody>
       </p:sp>
       <p:sp>
@@ -2194,7 +2390,112 @@
               <a:rPr lang="en-US" altLang="ko-KR" baseline="0" dirty="0" smtClean="0"/>
               <a:t>.</a:t>
             </a:r>
-            <a:endParaRPr lang="ko-KR" altLang="en-US" dirty="0"/>
+          </a:p>
+          <a:p>
+            <a:endParaRPr lang="en-US" altLang="ko-KR" baseline="0" dirty="0" smtClean="0"/>
+          </a:p>
+          <a:p>
+            <a:r>
+              <a:rPr lang="en-US" altLang="ko-KR" dirty="0" smtClean="0"/>
+              <a:t>Gene</a:t>
+            </a:r>
+            <a:r>
+              <a:rPr lang="en-US" altLang="ko-KR" baseline="0" dirty="0" smtClean="0"/>
+              <a:t> Ontology</a:t>
+            </a:r>
+            <a:r>
+              <a:rPr lang="ko-KR" altLang="en-US" baseline="0" dirty="0" smtClean="0"/>
+              <a:t>는 </a:t>
+            </a:r>
+            <a:r>
+              <a:rPr lang="en-US" altLang="ko-KR" baseline="0" dirty="0" smtClean="0"/>
+              <a:t>Biology model</a:t>
+            </a:r>
+            <a:r>
+              <a:rPr lang="ko-KR" altLang="en-US" baseline="0" dirty="0" smtClean="0"/>
+              <a:t>을 위한 </a:t>
+            </a:r>
+            <a:r>
+              <a:rPr lang="en-US" altLang="ko-KR" baseline="0" dirty="0" smtClean="0"/>
+              <a:t>framework.</a:t>
+            </a:r>
+          </a:p>
+          <a:p>
+            <a:r>
+              <a:rPr lang="en-US" altLang="ko-KR" sz="1200" b="1" i="0" kern="1200" dirty="0" smtClean="0">
+                <a:solidFill>
+                  <a:schemeClr val="tx1"/>
+                </a:solidFill>
+                <a:effectLst/>
+                <a:latin typeface="+mn-lt"/>
+                <a:ea typeface="+mn-ea"/>
+                <a:cs typeface="+mn-cs"/>
+              </a:rPr>
+              <a:t>molecular function</a:t>
+            </a:r>
+          </a:p>
+          <a:p>
+            <a:r>
+              <a:rPr lang="en-US" altLang="ko-KR" sz="1200" b="1" i="0" kern="1200" dirty="0" smtClean="0">
+                <a:solidFill>
+                  <a:schemeClr val="tx1"/>
+                </a:solidFill>
+                <a:effectLst/>
+                <a:latin typeface="+mn-lt"/>
+                <a:ea typeface="+mn-ea"/>
+                <a:cs typeface="+mn-cs"/>
+              </a:rPr>
+              <a:t>cellular component</a:t>
+            </a:r>
+          </a:p>
+          <a:p>
+            <a:r>
+              <a:rPr lang="en-US" altLang="ko-KR" sz="1200" b="1" i="0" kern="1200" dirty="0" smtClean="0">
+                <a:solidFill>
+                  <a:schemeClr val="tx1"/>
+                </a:solidFill>
+                <a:effectLst/>
+                <a:latin typeface="+mn-lt"/>
+                <a:ea typeface="+mn-ea"/>
+                <a:cs typeface="+mn-cs"/>
+              </a:rPr>
+              <a:t>biological process</a:t>
+            </a:r>
+            <a:r>
+              <a:rPr lang="ko-KR" altLang="en-US" sz="1200" b="0" i="0" kern="1200" baseline="0" dirty="0" smtClean="0">
+                <a:solidFill>
+                  <a:schemeClr val="tx1"/>
+                </a:solidFill>
+                <a:effectLst/>
+                <a:latin typeface="+mn-lt"/>
+                <a:ea typeface="+mn-ea"/>
+                <a:cs typeface="+mn-cs"/>
+              </a:rPr>
+              <a:t> 에  대한 정보를 가지고 있다</a:t>
+            </a:r>
+            <a:r>
+              <a:rPr lang="en-US" altLang="ko-KR" sz="1200" b="0" i="0" kern="1200" baseline="0" dirty="0" smtClean="0">
+                <a:solidFill>
+                  <a:schemeClr val="tx1"/>
+                </a:solidFill>
+                <a:effectLst/>
+                <a:latin typeface="+mn-lt"/>
+                <a:ea typeface="+mn-ea"/>
+                <a:cs typeface="+mn-cs"/>
+              </a:rPr>
+              <a:t>.</a:t>
+            </a:r>
+          </a:p>
+          <a:p>
+            <a:endParaRPr lang="en-US" altLang="ko-KR" sz="1200" b="1" i="0" kern="1200" dirty="0" smtClean="0">
+              <a:solidFill>
+                <a:schemeClr val="tx1"/>
+              </a:solidFill>
+              <a:effectLst/>
+              <a:latin typeface="+mn-lt"/>
+              <a:ea typeface="+mn-ea"/>
+              <a:cs typeface="+mn-cs"/>
+            </a:endParaRPr>
           </a:p>
         </p:txBody>
       </p:sp>
@@ -2280,38 +2581,61 @@
           <a:p>
             <a:r>
               <a:rPr lang="ko-KR" altLang="en-US" dirty="0" smtClean="0"/>
-              <a:t>가장 많이 사용되는 </a:t>
-            </a:r>
-            <a:r>
-              <a:rPr lang="en-US" altLang="ko-KR" dirty="0" err="1" smtClean="0"/>
-              <a:t>ontolgy</a:t>
-            </a:r>
+              <a:t>하지만 한계점도 존재한다</a:t>
+            </a:r>
+            <a:r>
+              <a:rPr lang="en-US" altLang="ko-KR" dirty="0" smtClean="0"/>
+              <a:t>.</a:t>
+            </a:r>
+          </a:p>
+          <a:p>
             <a:r>
               <a:rPr lang="ko-KR" altLang="en-US" dirty="0" smtClean="0"/>
-              <a:t>는</a:t>
-            </a:r>
-            <a:r>
-              <a:rPr lang="ko-KR" altLang="en-US" baseline="0" dirty="0" smtClean="0"/>
-              <a:t> </a:t>
-            </a:r>
-            <a:r>
-              <a:rPr lang="en-US" altLang="ko-KR" baseline="0" dirty="0" smtClean="0"/>
-              <a:t>GO</a:t>
-            </a:r>
-            <a:r>
-              <a:rPr lang="ko-KR" altLang="en-US" baseline="0" dirty="0" smtClean="0"/>
-              <a:t>와 </a:t>
-            </a:r>
-            <a:r>
-              <a:rPr lang="en-US" altLang="ko-KR" baseline="0" dirty="0" smtClean="0"/>
-              <a:t>UMLS</a:t>
-            </a:r>
-            <a:r>
-              <a:rPr lang="ko-KR" altLang="en-US" baseline="0" dirty="0" smtClean="0"/>
-              <a:t>이다</a:t>
-            </a:r>
-            <a:r>
-              <a:rPr lang="en-US" altLang="ko-KR" baseline="0" dirty="0" smtClean="0"/>
+              <a:t>많은 양의 데이터를 시각화 하려고 </a:t>
+            </a:r>
+            <a:r>
+              <a:rPr lang="ko-KR" altLang="en-US" dirty="0" err="1" smtClean="0"/>
+              <a:t>할때</a:t>
+            </a:r>
+            <a:endParaRPr lang="en-US" altLang="ko-KR" dirty="0" smtClean="0"/>
+          </a:p>
+          <a:p>
+            <a:r>
+              <a:rPr lang="en-US" altLang="ko-KR" dirty="0" smtClean="0"/>
+              <a:t>2D</a:t>
+            </a:r>
+            <a:r>
+              <a:rPr lang="ko-KR" altLang="en-US" dirty="0" smtClean="0"/>
+              <a:t>의 </a:t>
+            </a:r>
+            <a:r>
+              <a:rPr lang="ko-KR" altLang="en-US" dirty="0" err="1" smtClean="0"/>
+              <a:t>시각화시</a:t>
+            </a:r>
+            <a:r>
+              <a:rPr lang="ko-KR" altLang="en-US" dirty="0" smtClean="0"/>
+              <a:t> 더 복잡해 질 수 있다</a:t>
+            </a:r>
+            <a:r>
+              <a:rPr lang="en-US" altLang="ko-KR" dirty="0" smtClean="0"/>
+              <a:t>.</a:t>
+            </a:r>
+          </a:p>
+          <a:p>
+            <a:r>
+              <a:rPr lang="ko-KR" altLang="en-US" dirty="0" smtClean="0"/>
+              <a:t>그때는 </a:t>
+            </a:r>
+            <a:r>
+              <a:rPr lang="en-US" altLang="ko-KR" dirty="0" smtClean="0"/>
+              <a:t>3D </a:t>
+            </a:r>
+            <a:r>
+              <a:rPr lang="ko-KR" altLang="en-US" dirty="0" smtClean="0"/>
+              <a:t>시각화가 적절한 방법이다</a:t>
+            </a:r>
+            <a:r>
+              <a:rPr lang="en-US" altLang="ko-KR" dirty="0" smtClean="0"/>
               <a:t>.</a:t>
             </a:r>
             <a:endParaRPr lang="ko-KR" altLang="en-US" dirty="0"/>
@@ -5443,7 +5767,9 @@
           </a:xfrm>
         </p:spPr>
         <p:txBody>
-          <a:bodyPr/>
+          <a:bodyPr>
+            <a:normAutofit lnSpcReduction="10000"/>
+          </a:bodyPr>
           <a:lstStyle/>
           <a:p>
             <a:pPr marL="0" indent="0">
@@ -5460,7 +5786,57 @@
             </a:pPr>
             <a:r>
               <a:rPr lang="en-US" altLang="ko-KR" dirty="0" smtClean="0"/>
-              <a:t>		</a:t>
+              <a:t>	the </a:t>
+            </a:r>
+            <a:r>
+              <a:rPr lang="en-US" altLang="ko-KR" dirty="0"/>
+              <a:t>framework for the model of biology. </a:t>
+            </a:r>
+            <a:endParaRPr lang="en-US" altLang="ko-KR" dirty="0" smtClean="0"/>
+          </a:p>
+          <a:p>
+            <a:pPr marL="0" indent="0">
+              <a:buNone/>
+            </a:pPr>
+            <a:r>
+              <a:rPr lang="en-US" altLang="ko-KR" dirty="0"/>
+              <a:t>	</a:t>
+            </a:r>
+            <a:r>
+              <a:rPr lang="en-US" altLang="ko-KR" dirty="0" smtClean="0"/>
+              <a:t>The </a:t>
+            </a:r>
+            <a:r>
+              <a:rPr lang="en-US" altLang="ko-KR" dirty="0"/>
+              <a:t>GO defines </a:t>
+            </a:r>
+            <a:r>
+              <a:rPr lang="en-US" altLang="ko-KR" dirty="0" smtClean="0"/>
+              <a:t>	concepts/classes </a:t>
+            </a:r>
+            <a:r>
+              <a:rPr lang="en-US" altLang="ko-KR" dirty="0"/>
+              <a:t>used to describe gene </a:t>
+            </a:r>
+            <a:r>
+              <a:rPr lang="en-US" altLang="ko-KR" dirty="0" smtClean="0"/>
+              <a:t>	function</a:t>
+            </a:r>
+            <a:r>
+              <a:rPr lang="en-US" altLang="ko-KR" dirty="0"/>
+              <a:t>, </a:t>
+            </a:r>
+            <a:r>
+              <a:rPr lang="en-US" altLang="ko-KR" dirty="0" smtClean="0"/>
+              <a:t>and relationships </a:t>
+            </a:r>
+            <a:r>
+              <a:rPr lang="en-US" altLang="ko-KR" dirty="0"/>
+              <a:t>between these concepts.</a:t>
+            </a:r>
+            <a:r>
+              <a:rPr lang="en-US" altLang="ko-KR" dirty="0" smtClean="0"/>
+              <a:t>	</a:t>
             </a:r>
           </a:p>
           <a:p>
@@ -5882,35 +6258,6 @@
               <a:t>Mining</a:t>
             </a:r>
             <a:endParaRPr lang="en-US" altLang="ko-KR" dirty="0"/>
-          </a:p>
-        </p:txBody>
-      </p:sp>
-      <p:sp>
-        <p:nvSpPr>
-          <p:cNvPr id="6" name="직사각형 5"/>
-          <p:cNvSpPr/>
-          <p:nvPr/>
-        </p:nvSpPr>
-        <p:spPr>
-          <a:xfrm>
-            <a:off x="838200" y="1412103"/>
-            <a:ext cx="10269682" cy="584775"/>
-          </a:xfrm>
-          <a:prstGeom prst="rect">
-            <a:avLst/>
-          </a:prstGeom>
-        </p:spPr>
-        <p:txBody>
-          <a:bodyPr wrap="square">
-            <a:spAutoFit/>
-          </a:bodyPr>
-          <a:lstStyle/>
-          <a:p>
-            <a:r>
-              <a:rPr lang="en-US" altLang="ko-KR" sz="3200" dirty="0" smtClean="0"/>
-              <a:t>Information Extraction</a:t>
-            </a:r>
-            <a:endParaRPr lang="ko-KR" altLang="en-US" sz="3200" dirty="0"/>
           </a:p>
         </p:txBody>
       </p:sp>
@@ -6387,8 +6734,8 @@
         </p:nvSpPr>
         <p:spPr>
           <a:xfrm>
-            <a:off x="324091" y="2551694"/>
-            <a:ext cx="1938288" cy="923330"/>
+            <a:off x="333020" y="2743268"/>
+            <a:ext cx="1636923" cy="646331"/>
           </a:xfrm>
           <a:prstGeom prst="rect">
             <a:avLst/>
@@ -6413,13 +6760,7 @@
             </a:r>
             <a:r>
               <a:rPr lang="en-US" altLang="ko-KR" dirty="0" smtClean="0"/>
-              <a:t>rom PubMed or</a:t>
-            </a:r>
-          </a:p>
-          <a:p>
-            <a:r>
-              <a:rPr lang="en-US" altLang="ko-KR" dirty="0" smtClean="0"/>
-              <a:t>other Ontology</a:t>
+              <a:t>rom PubMed</a:t>
             </a:r>
           </a:p>
         </p:txBody>
@@ -6670,20 +7011,11 @@
             </a:pPr>
             <a:r>
               <a:rPr lang="en-US" altLang="ko-KR" dirty="0" smtClean="0"/>
-              <a:t>The more one knows about disease and drug,</a:t>
-            </a:r>
-          </a:p>
-          <a:p>
-            <a:pPr marL="0" indent="0">
-              <a:buNone/>
-            </a:pPr>
-            <a:r>
-              <a:rPr lang="en-US" altLang="ko-KR" dirty="0"/>
-              <a:t>	</a:t>
-            </a:r>
-            <a:r>
-              <a:rPr lang="en-US" altLang="ko-KR" dirty="0" smtClean="0"/>
-              <a:t>the more ‘educated’ a guess will be concerning selection 	of the right indication.</a:t>
+              <a:t>The more one knows about disease and drug, </a:t>
+            </a:r>
+            <a:r>
+              <a:rPr lang="en-US" altLang="ko-KR" dirty="0" smtClean="0"/>
+              <a:t>the more ‘educated’ a guess will be concerning selection of the right indication.</a:t>
             </a:r>
           </a:p>
           <a:p>
@@ -6692,7 +7024,7 @@
             </a:pPr>
             <a:r>
               <a:rPr lang="en-US" altLang="ko-KR" dirty="0" smtClean="0"/>
-              <a:t>Visualization techniques may provide additional guidance to 	DR exercises.</a:t>
+              <a:t>Visualization techniques may provide additional guidance to DR exercises.</a:t>
             </a:r>
           </a:p>
           <a:p>
@@ -8507,7 +8839,7 @@
         </p:spPr>
         <p:txBody>
           <a:bodyPr vert="horz" lIns="91440" tIns="45720" rIns="91440" bIns="45720" rtlCol="0">
-            <a:normAutofit/>
+            <a:normAutofit lnSpcReduction="10000"/>
           </a:bodyPr>
           <a:lstStyle>
             <a:lvl1pPr marL="228600" indent="-228600" algn="l" defTabSz="914400" rtl="0" eaLnBrk="1" latinLnBrk="1" hangingPunct="1">
@@ -8704,6 +9036,15 @@
             <a:pPr marL="0" indent="0">
               <a:buNone/>
             </a:pPr>
+            <a:r>
+              <a:rPr lang="en-US" altLang="ko-KR" dirty="0" smtClean="0"/>
+              <a:t>	</a:t>
+            </a:r>
+          </a:p>
+          <a:p>
+            <a:pPr marL="0" indent="0">
+              <a:buNone/>
+            </a:pPr>
             <a:endParaRPr lang="en-US" altLang="ko-KR" dirty="0" smtClean="0"/>
           </a:p>
           <a:p>
@@ -8727,6 +9068,537 @@
               <a:rPr lang="en-US" altLang="ko-KR" sz="1800" dirty="0" smtClean="0"/>
               <a:t>&lt;Subject, Predicate, Object&gt;</a:t>
             </a:r>
+          </a:p>
+        </p:txBody>
+      </p:sp>
+      <p:sp>
+        <p:nvSpPr>
+          <p:cNvPr id="3" name="Rectangle 1"/>
+          <p:cNvSpPr>
+            <a:spLocks noChangeArrowheads="1"/>
+          </p:cNvSpPr>
+          <p:nvPr/>
+        </p:nvSpPr>
+        <p:spPr bwMode="auto">
+          <a:xfrm>
+            <a:off x="1166107" y="4251160"/>
+            <a:ext cx="9859785" cy="738664"/>
+          </a:xfrm>
+          <a:prstGeom prst="rect">
+            <a:avLst/>
+          </a:prstGeom>
+          <a:solidFill>
+            <a:srgbClr val="F9F9F9"/>
+          </a:solidFill>
+          <a:ln>
+            <a:noFill/>
+          </a:ln>
+          <a:effectLst/>
+          <a:extLst>
+            <a:ext uri="{91240B29-F687-4F45-9708-019B960494DF}">
+              <a14:hiddenLine xmlns:a14="http://schemas.microsoft.com/office/drawing/2010/main" w="9525">
+                <a:solidFill>
+                  <a:schemeClr val="tx1"/>
+                </a:solidFill>
+                <a:miter lim="800000"/>
+                <a:headEnd/>
+                <a:tailEnd/>
+              </a14:hiddenLine>
+            </a:ext>
+            <a:ext uri="{AF507438-7753-43E0-B8FC-AC1667EBCBE1}">
+              <a14:hiddenEffects xmlns:a14="http://schemas.microsoft.com/office/drawing/2010/main">
+                <a:effectLst>
+                  <a:outerShdw dist="35921" dir="2700000" algn="ctr" rotWithShape="0">
+                    <a:schemeClr val="bg2"/>
+                  </a:outerShdw>
+                </a:effectLst>
+              </a14:hiddenEffects>
+            </a:ext>
+          </a:extLst>
+        </p:spPr>
+        <p:txBody>
+          <a:bodyPr vert="horz" wrap="square" lIns="91440" tIns="45720" rIns="91440" bIns="45720" numCol="1" anchor="ctr" anchorCtr="0" compatLnSpc="1">
+            <a:prstTxWarp prst="textNoShape">
+              <a:avLst/>
+            </a:prstTxWarp>
+            <a:spAutoFit/>
+          </a:bodyPr>
+          <a:lstStyle/>
+          <a:p>
+            <a:pPr marL="0" marR="0" lvl="0" indent="0" algn="l" defTabSz="914400" rtl="0" eaLnBrk="0" fontAlgn="base" latinLnBrk="0" hangingPunct="0">
+              <a:lnSpc>
+                <a:spcPct val="100000"/>
+              </a:lnSpc>
+              <a:spcBef>
+                <a:spcPct val="0"/>
+              </a:spcBef>
+              <a:spcAft>
+                <a:spcPct val="0"/>
+              </a:spcAft>
+              <a:buClrTx/>
+              <a:buSzTx/>
+              <a:buFontTx/>
+              <a:buNone/>
+              <a:tabLst/>
+            </a:pPr>
+            <a:r>
+              <a:rPr kumimoji="0" lang="ko-KR" altLang="ko-KR" sz="1400" b="1" i="0" u="none" strike="noStrike" cap="none" normalizeH="0" baseline="0" dirty="0" smtClean="0">
+                <a:ln>
+                  <a:noFill/>
+                </a:ln>
+                <a:solidFill>
+                  <a:srgbClr val="008000"/>
+                </a:solidFill>
+                <a:effectLst/>
+                <a:latin typeface="Arial Unicode MS" panose="020B0604020202020204" pitchFamily="50" charset="-127"/>
+                <a:ea typeface="Courier New" panose="02070309020205020404" pitchFamily="49" charset="0"/>
+              </a:rPr>
+              <a:t>&lt;Ontology</a:t>
+            </a:r>
+            <a:r>
+              <a:rPr kumimoji="0" lang="ko-KR" altLang="ko-KR" sz="1400" b="0" i="0" u="none" strike="noStrike" cap="none" normalizeH="0" baseline="0" dirty="0" smtClean="0">
+                <a:ln>
+                  <a:noFill/>
+                </a:ln>
+                <a:solidFill>
+                  <a:srgbClr val="000000"/>
+                </a:solidFill>
+                <a:effectLst/>
+                <a:latin typeface="Arial Unicode MS" panose="020B0604020202020204" pitchFamily="50" charset="-127"/>
+                <a:ea typeface="Courier New" panose="02070309020205020404" pitchFamily="49" charset="0"/>
+              </a:rPr>
+              <a:t> </a:t>
+            </a:r>
+            <a:r>
+              <a:rPr kumimoji="0" lang="ko-KR" altLang="ko-KR" sz="1400" b="0" i="0" u="none" strike="noStrike" cap="none" normalizeH="0" baseline="0" dirty="0" smtClean="0">
+                <a:ln>
+                  <a:noFill/>
+                </a:ln>
+                <a:solidFill>
+                  <a:srgbClr val="7D9029"/>
+                </a:solidFill>
+                <a:effectLst/>
+                <a:latin typeface="Arial Unicode MS" panose="020B0604020202020204" pitchFamily="50" charset="-127"/>
+                <a:ea typeface="Courier New" panose="02070309020205020404" pitchFamily="49" charset="0"/>
+              </a:rPr>
+              <a:t>ontologyIRI=</a:t>
+            </a:r>
+            <a:r>
+              <a:rPr kumimoji="0" lang="ko-KR" altLang="ko-KR" sz="1400" b="0" i="0" u="none" strike="noStrike" cap="none" normalizeH="0" baseline="0" dirty="0" smtClean="0">
+                <a:ln>
+                  <a:noFill/>
+                </a:ln>
+                <a:solidFill>
+                  <a:srgbClr val="BA2121"/>
+                </a:solidFill>
+                <a:effectLst/>
+                <a:latin typeface="Arial Unicode MS" panose="020B0604020202020204" pitchFamily="50" charset="-127"/>
+                <a:ea typeface="Courier New" panose="02070309020205020404" pitchFamily="49" charset="0"/>
+              </a:rPr>
+              <a:t>"http://example.com/tea.owl"</a:t>
+            </a:r>
+            <a:r>
+              <a:rPr kumimoji="0" lang="ko-KR" altLang="ko-KR" sz="1400" b="0" i="0" u="none" strike="noStrike" cap="none" normalizeH="0" baseline="0" dirty="0" smtClean="0">
+                <a:ln>
+                  <a:noFill/>
+                </a:ln>
+                <a:solidFill>
+                  <a:srgbClr val="000000"/>
+                </a:solidFill>
+                <a:effectLst/>
+                <a:latin typeface="Arial Unicode MS" panose="020B0604020202020204" pitchFamily="50" charset="-127"/>
+                <a:ea typeface="Courier New" panose="02070309020205020404" pitchFamily="49" charset="0"/>
+              </a:rPr>
+              <a:t> ...</a:t>
+            </a:r>
+            <a:r>
+              <a:rPr kumimoji="0" lang="ko-KR" altLang="ko-KR" sz="1400" b="1" i="0" u="none" strike="noStrike" cap="none" normalizeH="0" baseline="0" dirty="0" smtClean="0">
+                <a:ln>
+                  <a:noFill/>
+                </a:ln>
+                <a:solidFill>
+                  <a:srgbClr val="008000"/>
+                </a:solidFill>
+                <a:effectLst/>
+                <a:latin typeface="Arial Unicode MS" panose="020B0604020202020204" pitchFamily="50" charset="-127"/>
+                <a:ea typeface="Courier New" panose="02070309020205020404" pitchFamily="49" charset="0"/>
+              </a:rPr>
+              <a:t>&gt;</a:t>
+            </a:r>
+            <a:r>
+              <a:rPr kumimoji="0" lang="ko-KR" altLang="ko-KR" sz="1400" b="0" i="0" u="none" strike="noStrike" cap="none" normalizeH="0" baseline="0" dirty="0" smtClean="0">
+                <a:ln>
+                  <a:noFill/>
+                </a:ln>
+                <a:solidFill>
+                  <a:srgbClr val="000000"/>
+                </a:solidFill>
+                <a:effectLst/>
+                <a:latin typeface="Arial Unicode MS" panose="020B0604020202020204" pitchFamily="50" charset="-127"/>
+                <a:ea typeface="Courier New" panose="02070309020205020404" pitchFamily="49" charset="0"/>
+              </a:rPr>
+              <a:t> </a:t>
+            </a:r>
+            <a:endParaRPr kumimoji="0" lang="en-US" altLang="ko-KR" sz="1400" b="0" i="0" u="none" strike="noStrike" cap="none" normalizeH="0" baseline="0" dirty="0" smtClean="0">
+              <a:ln>
+                <a:noFill/>
+              </a:ln>
+              <a:solidFill>
+                <a:srgbClr val="000000"/>
+              </a:solidFill>
+              <a:effectLst/>
+              <a:latin typeface="Arial Unicode MS" panose="020B0604020202020204" pitchFamily="50" charset="-127"/>
+              <a:ea typeface="Courier New" panose="02070309020205020404" pitchFamily="49" charset="0"/>
+            </a:endParaRPr>
+          </a:p>
+          <a:p>
+            <a:pPr marL="0" marR="0" lvl="0" indent="0" algn="l" defTabSz="914400" rtl="0" eaLnBrk="0" fontAlgn="base" latinLnBrk="0" hangingPunct="0">
+              <a:lnSpc>
+                <a:spcPct val="100000"/>
+              </a:lnSpc>
+              <a:spcBef>
+                <a:spcPct val="0"/>
+              </a:spcBef>
+              <a:spcAft>
+                <a:spcPct val="0"/>
+              </a:spcAft>
+              <a:buClrTx/>
+              <a:buSzTx/>
+              <a:buFontTx/>
+              <a:buNone/>
+              <a:tabLst/>
+            </a:pPr>
+            <a:r>
+              <a:rPr kumimoji="0" lang="ko-KR" altLang="ko-KR" sz="1400" b="1" i="0" u="none" strike="noStrike" cap="none" normalizeH="0" baseline="0" dirty="0" smtClean="0">
+                <a:ln>
+                  <a:noFill/>
+                </a:ln>
+                <a:solidFill>
+                  <a:srgbClr val="008000"/>
+                </a:solidFill>
+                <a:effectLst/>
+                <a:latin typeface="Arial Unicode MS" panose="020B0604020202020204" pitchFamily="50" charset="-127"/>
+                <a:ea typeface="Courier New" panose="02070309020205020404" pitchFamily="49" charset="0"/>
+              </a:rPr>
+              <a:t>&lt;Prefix</a:t>
+            </a:r>
+            <a:r>
+              <a:rPr kumimoji="0" lang="ko-KR" altLang="ko-KR" sz="1400" b="0" i="0" u="none" strike="noStrike" cap="none" normalizeH="0" baseline="0" dirty="0" smtClean="0">
+                <a:ln>
+                  <a:noFill/>
+                </a:ln>
+                <a:solidFill>
+                  <a:srgbClr val="000000"/>
+                </a:solidFill>
+                <a:effectLst/>
+                <a:latin typeface="Arial Unicode MS" panose="020B0604020202020204" pitchFamily="50" charset="-127"/>
+                <a:ea typeface="Courier New" panose="02070309020205020404" pitchFamily="49" charset="0"/>
+              </a:rPr>
+              <a:t> </a:t>
+            </a:r>
+            <a:r>
+              <a:rPr kumimoji="0" lang="ko-KR" altLang="ko-KR" sz="1400" b="0" i="0" u="none" strike="noStrike" cap="none" normalizeH="0" baseline="0" dirty="0" smtClean="0">
+                <a:ln>
+                  <a:noFill/>
+                </a:ln>
+                <a:solidFill>
+                  <a:srgbClr val="7D9029"/>
+                </a:solidFill>
+                <a:effectLst/>
+                <a:latin typeface="Arial Unicode MS" panose="020B0604020202020204" pitchFamily="50" charset="-127"/>
+                <a:ea typeface="Courier New" panose="02070309020205020404" pitchFamily="49" charset="0"/>
+              </a:rPr>
+              <a:t>name=</a:t>
+            </a:r>
+            <a:r>
+              <a:rPr kumimoji="0" lang="ko-KR" altLang="ko-KR" sz="1400" b="0" i="0" u="none" strike="noStrike" cap="none" normalizeH="0" baseline="0" dirty="0" smtClean="0">
+                <a:ln>
+                  <a:noFill/>
+                </a:ln>
+                <a:solidFill>
+                  <a:srgbClr val="BA2121"/>
+                </a:solidFill>
+                <a:effectLst/>
+                <a:latin typeface="Arial Unicode MS" panose="020B0604020202020204" pitchFamily="50" charset="-127"/>
+                <a:ea typeface="Courier New" panose="02070309020205020404" pitchFamily="49" charset="0"/>
+              </a:rPr>
+              <a:t>"owl"</a:t>
+            </a:r>
+            <a:r>
+              <a:rPr kumimoji="0" lang="ko-KR" altLang="ko-KR" sz="1400" b="0" i="0" u="none" strike="noStrike" cap="none" normalizeH="0" baseline="0" dirty="0" smtClean="0">
+                <a:ln>
+                  <a:noFill/>
+                </a:ln>
+                <a:solidFill>
+                  <a:srgbClr val="000000"/>
+                </a:solidFill>
+                <a:effectLst/>
+                <a:latin typeface="Arial Unicode MS" panose="020B0604020202020204" pitchFamily="50" charset="-127"/>
+                <a:ea typeface="Courier New" panose="02070309020205020404" pitchFamily="49" charset="0"/>
+              </a:rPr>
+              <a:t> </a:t>
+            </a:r>
+            <a:r>
+              <a:rPr kumimoji="0" lang="ko-KR" altLang="ko-KR" sz="1400" b="0" i="0" u="none" strike="noStrike" cap="none" normalizeH="0" baseline="0" dirty="0" smtClean="0">
+                <a:ln>
+                  <a:noFill/>
+                </a:ln>
+                <a:solidFill>
+                  <a:srgbClr val="7D9029"/>
+                </a:solidFill>
+                <a:effectLst/>
+                <a:latin typeface="Arial Unicode MS" panose="020B0604020202020204" pitchFamily="50" charset="-127"/>
+                <a:ea typeface="Courier New" panose="02070309020205020404" pitchFamily="49" charset="0"/>
+              </a:rPr>
+              <a:t>IRI=</a:t>
+            </a:r>
+            <a:r>
+              <a:rPr kumimoji="0" lang="ko-KR" altLang="ko-KR" sz="1400" b="0" i="0" u="none" strike="noStrike" cap="none" normalizeH="0" baseline="0" dirty="0" smtClean="0">
+                <a:ln>
+                  <a:noFill/>
+                </a:ln>
+                <a:solidFill>
+                  <a:srgbClr val="BA2121"/>
+                </a:solidFill>
+                <a:effectLst/>
+                <a:latin typeface="Arial Unicode MS" panose="020B0604020202020204" pitchFamily="50" charset="-127"/>
+                <a:ea typeface="Courier New" panose="02070309020205020404" pitchFamily="49" charset="0"/>
+              </a:rPr>
+              <a:t>"http://www.w3.org/2002/07/owl#"</a:t>
+            </a:r>
+            <a:r>
+              <a:rPr kumimoji="0" lang="ko-KR" altLang="ko-KR" sz="1400" b="1" i="0" u="none" strike="noStrike" cap="none" normalizeH="0" baseline="0" dirty="0" smtClean="0">
+                <a:ln>
+                  <a:noFill/>
+                </a:ln>
+                <a:solidFill>
+                  <a:srgbClr val="008000"/>
+                </a:solidFill>
+                <a:effectLst/>
+                <a:latin typeface="Arial Unicode MS" panose="020B0604020202020204" pitchFamily="50" charset="-127"/>
+                <a:ea typeface="Courier New" panose="02070309020205020404" pitchFamily="49" charset="0"/>
+              </a:rPr>
+              <a:t>/&gt;</a:t>
+            </a:r>
+            <a:r>
+              <a:rPr kumimoji="0" lang="ko-KR" altLang="ko-KR" sz="1400" b="0" i="0" u="none" strike="noStrike" cap="none" normalizeH="0" baseline="0" dirty="0" smtClean="0">
+                <a:ln>
+                  <a:noFill/>
+                </a:ln>
+                <a:solidFill>
+                  <a:srgbClr val="000000"/>
+                </a:solidFill>
+                <a:effectLst/>
+                <a:latin typeface="Arial Unicode MS" panose="020B0604020202020204" pitchFamily="50" charset="-127"/>
+                <a:ea typeface="Courier New" panose="02070309020205020404" pitchFamily="49" charset="0"/>
+              </a:rPr>
+              <a:t> </a:t>
+            </a:r>
+            <a:r>
+              <a:rPr kumimoji="0" lang="ko-KR" altLang="ko-KR" sz="1400" b="1" i="0" u="none" strike="noStrike" cap="none" normalizeH="0" baseline="0" dirty="0" smtClean="0">
+                <a:ln>
+                  <a:noFill/>
+                </a:ln>
+                <a:solidFill>
+                  <a:srgbClr val="008000"/>
+                </a:solidFill>
+                <a:effectLst/>
+                <a:latin typeface="Arial Unicode MS" panose="020B0604020202020204" pitchFamily="50" charset="-127"/>
+                <a:ea typeface="Courier New" panose="02070309020205020404" pitchFamily="49" charset="0"/>
+              </a:rPr>
+              <a:t>&lt;Declaration&gt;</a:t>
+            </a:r>
+            <a:r>
+              <a:rPr kumimoji="0" lang="ko-KR" altLang="ko-KR" sz="1400" b="0" i="0" u="none" strike="noStrike" cap="none" normalizeH="0" baseline="0" dirty="0" smtClean="0">
+                <a:ln>
+                  <a:noFill/>
+                </a:ln>
+                <a:solidFill>
+                  <a:srgbClr val="000000"/>
+                </a:solidFill>
+                <a:effectLst/>
+                <a:latin typeface="Arial Unicode MS" panose="020B0604020202020204" pitchFamily="50" charset="-127"/>
+                <a:ea typeface="Courier New" panose="02070309020205020404" pitchFamily="49" charset="0"/>
+              </a:rPr>
+              <a:t> </a:t>
+            </a:r>
+            <a:r>
+              <a:rPr kumimoji="0" lang="ko-KR" altLang="ko-KR" sz="1400" b="1" i="0" u="none" strike="noStrike" cap="none" normalizeH="0" baseline="0" dirty="0" smtClean="0">
+                <a:ln>
+                  <a:noFill/>
+                </a:ln>
+                <a:solidFill>
+                  <a:srgbClr val="008000"/>
+                </a:solidFill>
+                <a:effectLst/>
+                <a:latin typeface="Arial Unicode MS" panose="020B0604020202020204" pitchFamily="50" charset="-127"/>
+                <a:ea typeface="Courier New" panose="02070309020205020404" pitchFamily="49" charset="0"/>
+              </a:rPr>
+              <a:t>&lt;Class</a:t>
+            </a:r>
+            <a:r>
+              <a:rPr kumimoji="0" lang="ko-KR" altLang="ko-KR" sz="1400" b="0" i="0" u="none" strike="noStrike" cap="none" normalizeH="0" baseline="0" dirty="0" smtClean="0">
+                <a:ln>
+                  <a:noFill/>
+                </a:ln>
+                <a:solidFill>
+                  <a:srgbClr val="000000"/>
+                </a:solidFill>
+                <a:effectLst/>
+                <a:latin typeface="Arial Unicode MS" panose="020B0604020202020204" pitchFamily="50" charset="-127"/>
+                <a:ea typeface="Courier New" panose="02070309020205020404" pitchFamily="49" charset="0"/>
+              </a:rPr>
+              <a:t> </a:t>
+            </a:r>
+            <a:r>
+              <a:rPr kumimoji="0" lang="ko-KR" altLang="ko-KR" sz="1400" b="0" i="0" u="none" strike="noStrike" cap="none" normalizeH="0" baseline="0" dirty="0" smtClean="0">
+                <a:ln>
+                  <a:noFill/>
+                </a:ln>
+                <a:solidFill>
+                  <a:srgbClr val="7D9029"/>
+                </a:solidFill>
+                <a:effectLst/>
+                <a:latin typeface="Arial Unicode MS" panose="020B0604020202020204" pitchFamily="50" charset="-127"/>
+                <a:ea typeface="Courier New" panose="02070309020205020404" pitchFamily="49" charset="0"/>
+              </a:rPr>
+              <a:t>IRI=</a:t>
+            </a:r>
+            <a:r>
+              <a:rPr kumimoji="0" lang="ko-KR" altLang="ko-KR" sz="1400" b="0" i="0" u="none" strike="noStrike" cap="none" normalizeH="0" baseline="0" dirty="0" smtClean="0">
+                <a:ln>
+                  <a:noFill/>
+                </a:ln>
+                <a:solidFill>
+                  <a:srgbClr val="BA2121"/>
+                </a:solidFill>
+                <a:effectLst/>
+                <a:latin typeface="Arial Unicode MS" panose="020B0604020202020204" pitchFamily="50" charset="-127"/>
+                <a:ea typeface="Courier New" panose="02070309020205020404" pitchFamily="49" charset="0"/>
+              </a:rPr>
+              <a:t>"Tea"</a:t>
+            </a:r>
+            <a:r>
+              <a:rPr kumimoji="0" lang="ko-KR" altLang="ko-KR" sz="1400" b="1" i="0" u="none" strike="noStrike" cap="none" normalizeH="0" baseline="0" dirty="0" smtClean="0">
+                <a:ln>
+                  <a:noFill/>
+                </a:ln>
+                <a:solidFill>
+                  <a:srgbClr val="008000"/>
+                </a:solidFill>
+                <a:effectLst/>
+                <a:latin typeface="Arial Unicode MS" panose="020B0604020202020204" pitchFamily="50" charset="-127"/>
+                <a:ea typeface="Courier New" panose="02070309020205020404" pitchFamily="49" charset="0"/>
+              </a:rPr>
+              <a:t>/&gt;</a:t>
+            </a:r>
+            <a:r>
+              <a:rPr kumimoji="0" lang="ko-KR" altLang="ko-KR" sz="1400" b="0" i="0" u="none" strike="noStrike" cap="none" normalizeH="0" baseline="0" dirty="0" smtClean="0">
+                <a:ln>
+                  <a:noFill/>
+                </a:ln>
+                <a:solidFill>
+                  <a:srgbClr val="000000"/>
+                </a:solidFill>
+                <a:effectLst/>
+                <a:latin typeface="Arial Unicode MS" panose="020B0604020202020204" pitchFamily="50" charset="-127"/>
+                <a:ea typeface="Courier New" panose="02070309020205020404" pitchFamily="49" charset="0"/>
+              </a:rPr>
+              <a:t> </a:t>
+            </a:r>
+            <a:r>
+              <a:rPr kumimoji="0" lang="ko-KR" altLang="ko-KR" sz="1400" b="1" i="0" u="none" strike="noStrike" cap="none" normalizeH="0" baseline="0" dirty="0" smtClean="0">
+                <a:ln>
+                  <a:noFill/>
+                </a:ln>
+                <a:solidFill>
+                  <a:srgbClr val="008000"/>
+                </a:solidFill>
+                <a:effectLst/>
+                <a:latin typeface="Arial Unicode MS" panose="020B0604020202020204" pitchFamily="50" charset="-127"/>
+                <a:ea typeface="Courier New" panose="02070309020205020404" pitchFamily="49" charset="0"/>
+              </a:rPr>
+              <a:t>&lt;/Declaration&gt;</a:t>
+            </a:r>
+            <a:r>
+              <a:rPr kumimoji="0" lang="ko-KR" altLang="ko-KR" sz="1400" b="0" i="0" u="none" strike="noStrike" cap="none" normalizeH="0" baseline="0" dirty="0" smtClean="0">
+                <a:ln>
+                  <a:noFill/>
+                </a:ln>
+                <a:solidFill>
+                  <a:srgbClr val="000000"/>
+                </a:solidFill>
+                <a:effectLst/>
+                <a:latin typeface="Arial Unicode MS" panose="020B0604020202020204" pitchFamily="50" charset="-127"/>
+                <a:ea typeface="Courier New" panose="02070309020205020404" pitchFamily="49" charset="0"/>
+              </a:rPr>
+              <a:t> </a:t>
+            </a:r>
+            <a:endParaRPr kumimoji="0" lang="en-US" altLang="ko-KR" sz="1400" b="0" i="0" u="none" strike="noStrike" cap="none" normalizeH="0" baseline="0" dirty="0" smtClean="0">
+              <a:ln>
+                <a:noFill/>
+              </a:ln>
+              <a:solidFill>
+                <a:srgbClr val="000000"/>
+              </a:solidFill>
+              <a:effectLst/>
+              <a:latin typeface="Arial Unicode MS" panose="020B0604020202020204" pitchFamily="50" charset="-127"/>
+              <a:ea typeface="Courier New" panose="02070309020205020404" pitchFamily="49" charset="0"/>
+            </a:endParaRPr>
+          </a:p>
+          <a:p>
+            <a:pPr marL="0" marR="0" lvl="0" indent="0" algn="l" defTabSz="914400" rtl="0" eaLnBrk="0" fontAlgn="base" latinLnBrk="0" hangingPunct="0">
+              <a:lnSpc>
+                <a:spcPct val="100000"/>
+              </a:lnSpc>
+              <a:spcBef>
+                <a:spcPct val="0"/>
+              </a:spcBef>
+              <a:spcAft>
+                <a:spcPct val="0"/>
+              </a:spcAft>
+              <a:buClrTx/>
+              <a:buSzTx/>
+              <a:buFontTx/>
+              <a:buNone/>
+              <a:tabLst/>
+            </a:pPr>
+            <a:r>
+              <a:rPr kumimoji="0" lang="ko-KR" altLang="ko-KR" sz="1400" b="1" i="0" u="none" strike="noStrike" cap="none" normalizeH="0" baseline="0" dirty="0" smtClean="0">
+                <a:ln>
+                  <a:noFill/>
+                </a:ln>
+                <a:solidFill>
+                  <a:srgbClr val="008000"/>
+                </a:solidFill>
+                <a:effectLst/>
+                <a:latin typeface="Arial Unicode MS" panose="020B0604020202020204" pitchFamily="50" charset="-127"/>
+                <a:ea typeface="Courier New" panose="02070309020205020404" pitchFamily="49" charset="0"/>
+              </a:rPr>
+              <a:t>&lt;/Ontology&gt;</a:t>
+            </a:r>
+            <a:r>
+              <a:rPr kumimoji="0" lang="ko-KR" altLang="ko-KR" sz="1100" b="0" i="0" u="none" strike="noStrike" cap="none" normalizeH="0" baseline="0" dirty="0" smtClean="0">
+                <a:ln>
+                  <a:noFill/>
+                </a:ln>
+                <a:solidFill>
+                  <a:schemeClr val="tx1"/>
+                </a:solidFill>
+                <a:effectLst/>
+              </a:rPr>
+              <a:t> </a:t>
+            </a:r>
+            <a:endParaRPr kumimoji="0" lang="ko-KR" altLang="ko-KR" sz="3200" b="0" i="0" u="none" strike="noStrike" cap="none" normalizeH="0" baseline="0" dirty="0" smtClean="0">
+              <a:ln>
+                <a:noFill/>
+              </a:ln>
+              <a:solidFill>
+                <a:schemeClr val="tx1"/>
+              </a:solidFill>
+              <a:effectLst/>
+              <a:latin typeface="Arial" panose="020B0604020202020204" pitchFamily="34" charset="0"/>
+            </a:endParaRPr>
           </a:p>
         </p:txBody>
       </p:sp>

</xml_diff>